<commit_message>
Udate material for qc
</commit_message>
<xml_diff>
--- a/BOQC-Basis of Quantum computing/Slide/0. Basic math.pptx
+++ b/BOQC-Basis of Quantum computing/Slide/0. Basic math.pptx
@@ -229,7 +229,7 @@
           <a:p>
             <a:fld id="{BF7226A7-5670-4E33-BDB8-C41537D25060}" type="datetimeFigureOut">
               <a:rPr lang="vi-VN" smtClean="0"/>
-              <a:t>26/11/2021</a:t>
+              <a:t>28/08/2023</a:t>
             </a:fld>
             <a:endParaRPr lang="vi-VN"/>
           </a:p>
@@ -734,7 +734,7 @@
           <a:p>
             <a:fld id="{A015C75D-4FEA-45E7-93A1-FAAF79A76D77}" type="datetime1">
               <a:rPr lang="vi-VN" smtClean="0"/>
-              <a:t>26/11/2021</a:t>
+              <a:t>28/08/2023</a:t>
             </a:fld>
             <a:endParaRPr lang="vi-VN"/>
           </a:p>
@@ -932,7 +932,7 @@
           <a:p>
             <a:fld id="{5B134A02-4881-4DD1-B683-8C5B7DF23EAB}" type="datetime1">
               <a:rPr lang="vi-VN" smtClean="0"/>
-              <a:t>26/11/2021</a:t>
+              <a:t>28/08/2023</a:t>
             </a:fld>
             <a:endParaRPr lang="vi-VN"/>
           </a:p>
@@ -1140,7 +1140,7 @@
           <a:p>
             <a:fld id="{79BF513D-02BD-42E1-A3BB-BBA92D968E71}" type="datetime1">
               <a:rPr lang="vi-VN" smtClean="0"/>
-              <a:t>26/11/2021</a:t>
+              <a:t>28/08/2023</a:t>
             </a:fld>
             <a:endParaRPr lang="vi-VN"/>
           </a:p>
@@ -1338,7 +1338,7 @@
           <a:p>
             <a:fld id="{BC14C8B4-E2CF-42F4-9553-DBCBA282C932}" type="datetime1">
               <a:rPr lang="vi-VN" smtClean="0"/>
-              <a:t>26/11/2021</a:t>
+              <a:t>28/08/2023</a:t>
             </a:fld>
             <a:endParaRPr lang="vi-VN"/>
           </a:p>
@@ -1613,7 +1613,7 @@
           <a:p>
             <a:fld id="{B578E9D8-472C-4C1F-A304-29EDDA8E7801}" type="datetime1">
               <a:rPr lang="vi-VN" smtClean="0"/>
-              <a:t>26/11/2021</a:t>
+              <a:t>28/08/2023</a:t>
             </a:fld>
             <a:endParaRPr lang="vi-VN"/>
           </a:p>
@@ -1878,7 +1878,7 @@
           <a:p>
             <a:fld id="{0DC1156C-C915-40B0-99E7-725153F17CB8}" type="datetime1">
               <a:rPr lang="vi-VN" smtClean="0"/>
-              <a:t>26/11/2021</a:t>
+              <a:t>28/08/2023</a:t>
             </a:fld>
             <a:endParaRPr lang="vi-VN"/>
           </a:p>
@@ -2290,7 +2290,7 @@
           <a:p>
             <a:fld id="{E3BF269C-9302-462A-A29D-B1726E2FF2B3}" type="datetime1">
               <a:rPr lang="vi-VN" smtClean="0"/>
-              <a:t>26/11/2021</a:t>
+              <a:t>28/08/2023</a:t>
             </a:fld>
             <a:endParaRPr lang="vi-VN"/>
           </a:p>
@@ -2431,7 +2431,7 @@
           <a:p>
             <a:fld id="{87502E64-9B66-4E9C-8177-B105D4A4CA21}" type="datetime1">
               <a:rPr lang="vi-VN" smtClean="0"/>
-              <a:t>26/11/2021</a:t>
+              <a:t>28/08/2023</a:t>
             </a:fld>
             <a:endParaRPr lang="vi-VN"/>
           </a:p>
@@ -2544,7 +2544,7 @@
           <a:p>
             <a:fld id="{31BE5C93-7BDE-4B7B-B36B-4C7750B9EB7E}" type="datetime1">
               <a:rPr lang="vi-VN" smtClean="0"/>
-              <a:t>26/11/2021</a:t>
+              <a:t>28/08/2023</a:t>
             </a:fld>
             <a:endParaRPr lang="vi-VN"/>
           </a:p>
@@ -2855,7 +2855,7 @@
           <a:p>
             <a:fld id="{43CD0C27-6F58-4C86-98ED-7429D1160C8C}" type="datetime1">
               <a:rPr lang="vi-VN" smtClean="0"/>
-              <a:t>26/11/2021</a:t>
+              <a:t>28/08/2023</a:t>
             </a:fld>
             <a:endParaRPr lang="vi-VN"/>
           </a:p>
@@ -3143,7 +3143,7 @@
           <a:p>
             <a:fld id="{7805ADDE-E531-4964-B9E6-E565AD4526BC}" type="datetime1">
               <a:rPr lang="vi-VN" smtClean="0"/>
-              <a:t>26/11/2021</a:t>
+              <a:t>28/08/2023</a:t>
             </a:fld>
             <a:endParaRPr lang="vi-VN"/>
           </a:p>
@@ -3384,7 +3384,7 @@
           <a:p>
             <a:fld id="{15ADB5C7-DDB5-4B1E-8296-AE1CA4EE8D37}" type="datetime1">
               <a:rPr lang="vi-VN" smtClean="0"/>
-              <a:t>26/11/2021</a:t>
+              <a:t>28/08/2023</a:t>
             </a:fld>
             <a:endParaRPr lang="vi-VN"/>
           </a:p>
@@ -5208,13 +5208,7 @@
                               <a:rPr lang="en-US" b="0" i="1" smtClean="0">
                                 <a:latin typeface="Cambria Math" panose="02040503050406030204" pitchFamily="18" charset="0"/>
                               </a:rPr>
-                              <m:t>≥</m:t>
-                            </m:r>
-                            <m:r>
-                              <a:rPr lang="en-US" b="0" i="1" smtClean="0">
-                                <a:latin typeface="Cambria Math" panose="02040503050406030204" pitchFamily="18" charset="0"/>
-                              </a:rPr>
-                              <m:t>0</m:t>
+                              <m:t>≥0</m:t>
                             </m:r>
                           </m:e>
                         </m:nary>
@@ -6544,7 +6538,7 @@
           <a:p>
             <a:r>
               <a:rPr lang="en-US"/>
-              <a:t>1.4. Inner prodduct</a:t>
+              <a:t>1.4. Inner product</a:t>
             </a:r>
             <a:endParaRPr lang="vi-VN"/>
           </a:p>
@@ -6665,13 +6659,7 @@
                       <a:rPr lang="en-US" b="0" i="1" smtClean="0">
                         <a:latin typeface="Cambria Math" panose="02040503050406030204" pitchFamily="18" charset="0"/>
                       </a:rPr>
-                      <m:t>=</m:t>
-                    </m:r>
-                    <m:r>
-                      <a:rPr lang="en-US" b="0" i="1" smtClean="0">
-                        <a:latin typeface="Cambria Math" panose="02040503050406030204" pitchFamily="18" charset="0"/>
-                      </a:rPr>
-                      <m:t>0</m:t>
+                      <m:t>=0</m:t>
                     </m:r>
                   </m:oMath>
                 </a14:m>
@@ -7008,13 +6996,7 @@
                         <a:rPr lang="en-US" b="0" i="1" smtClean="0">
                           <a:latin typeface="Cambria Math" panose="02040503050406030204" pitchFamily="18" charset="0"/>
                         </a:rPr>
-                        <m:t>=</m:t>
-                      </m:r>
-                      <m:r>
-                        <a:rPr lang="en-US" b="0" i="1" smtClean="0">
-                          <a:latin typeface="Cambria Math" panose="02040503050406030204" pitchFamily="18" charset="0"/>
-                        </a:rPr>
-                        <m:t>0</m:t>
+                        <m:t>=0</m:t>
                       </m:r>
                     </m:oMath>
                   </m:oMathPara>
@@ -7611,13 +7593,7 @@
                       <a:rPr lang="en-US" b="0" i="1" smtClean="0">
                         <a:latin typeface="Cambria Math" panose="02040503050406030204" pitchFamily="18" charset="0"/>
                       </a:rPr>
-                      <m:t>=</m:t>
-                    </m:r>
-                    <m:r>
-                      <a:rPr lang="en-US" b="0" i="1" smtClean="0">
-                        <a:latin typeface="Cambria Math" panose="02040503050406030204" pitchFamily="18" charset="0"/>
-                      </a:rPr>
-                      <m:t>1</m:t>
+                      <m:t>=1</m:t>
                     </m:r>
                   </m:oMath>
                 </a14:m>
@@ -9275,13 +9251,7 @@
                                         <a:rPr lang="en-US" b="0" i="1" smtClean="0">
                                           <a:latin typeface="Cambria Math" panose="02040503050406030204" pitchFamily="18" charset="0"/>
                                         </a:rPr>
-                                        <m:t>+</m:t>
-                                      </m:r>
-                                      <m:r>
-                                        <a:rPr lang="en-US" b="0" i="1" smtClean="0">
-                                          <a:latin typeface="Cambria Math" panose="02040503050406030204" pitchFamily="18" charset="0"/>
-                                        </a:rPr>
-                                        <m:t>1</m:t>
+                                        <m:t>+1</m:t>
                                       </m:r>
                                     </m:sub>
                                   </m:sSub>
@@ -9340,13 +9310,7 @@
                                             <a:rPr lang="en-US" b="0" i="1" smtClean="0">
                                               <a:latin typeface="Cambria Math" panose="02040503050406030204" pitchFamily="18" charset="0"/>
                                             </a:rPr>
-                                            <m:t>+</m:t>
-                                          </m:r>
-                                          <m:r>
-                                            <a:rPr lang="en-US" b="0" i="1" smtClean="0">
-                                              <a:latin typeface="Cambria Math" panose="02040503050406030204" pitchFamily="18" charset="0"/>
-                                            </a:rPr>
-                                            <m:t>1</m:t>
+                                            <m:t>+1</m:t>
                                           </m:r>
                                         </m:sub>
                                       </m:sSub>
@@ -9471,13 +9435,7 @@
                                                 <a:rPr lang="en-US" b="0" i="1" smtClean="0">
                                                   <a:latin typeface="Cambria Math" panose="02040503050406030204" pitchFamily="18" charset="0"/>
                                                 </a:rPr>
-                                                <m:t>+</m:t>
-                                              </m:r>
-                                              <m:r>
-                                                <a:rPr lang="en-US" b="0" i="1" smtClean="0">
-                                                  <a:latin typeface="Cambria Math" panose="02040503050406030204" pitchFamily="18" charset="0"/>
-                                                </a:rPr>
-                                                <m:t>1</m:t>
+                                                <m:t>+1</m:t>
                                               </m:r>
                                             </m:sub>
                                           </m:sSub>
@@ -9573,13 +9531,7 @@
                                                 <a:rPr lang="en-US" i="1">
                                                   <a:latin typeface="Cambria Math" panose="02040503050406030204" pitchFamily="18" charset="0"/>
                                                 </a:rPr>
-                                                <m:t>+</m:t>
-                                              </m:r>
-                                              <m:r>
-                                                <a:rPr lang="en-US" i="1">
-                                                  <a:latin typeface="Cambria Math" panose="02040503050406030204" pitchFamily="18" charset="0"/>
-                                                </a:rPr>
-                                                <m:t>1</m:t>
+                                                <m:t>+1</m:t>
                                               </m:r>
                                             </m:sub>
                                           </m:sSub>
@@ -9614,13 +9566,7 @@
                                             <a:rPr lang="en-US" i="1">
                                               <a:latin typeface="Cambria Math" panose="02040503050406030204" pitchFamily="18" charset="0"/>
                                             </a:rPr>
-                                            <m:t>=</m:t>
-                                          </m:r>
-                                          <m:r>
-                                            <a:rPr lang="en-US" i="1">
-                                              <a:latin typeface="Cambria Math" panose="02040503050406030204" pitchFamily="18" charset="0"/>
-                                            </a:rPr>
-                                            <m:t>1</m:t>
+                                            <m:t>=1</m:t>
                                           </m:r>
                                         </m:sub>
                                         <m:sup>
@@ -9701,13 +9647,7 @@
                                                     <a:rPr lang="en-US" i="1">
                                                       <a:latin typeface="Cambria Math" panose="02040503050406030204" pitchFamily="18" charset="0"/>
                                                     </a:rPr>
-                                                    <m:t>+</m:t>
-                                                  </m:r>
-                                                  <m:r>
-                                                    <a:rPr lang="en-US" i="1">
-                                                      <a:latin typeface="Cambria Math" panose="02040503050406030204" pitchFamily="18" charset="0"/>
-                                                    </a:rPr>
-                                                    <m:t>1</m:t>
+                                                    <m:t>+1</m:t>
                                                   </m:r>
                                                 </m:sub>
                                               </m:sSub>
@@ -10161,13 +10101,7 @@
                       <a:rPr lang="en-US" b="0" i="1" smtClean="0">
                         <a:latin typeface="Cambria Math" panose="02040503050406030204" pitchFamily="18" charset="0"/>
                       </a:rPr>
-                      <m:t>⟩=</m:t>
-                    </m:r>
-                    <m:r>
-                      <a:rPr lang="en-US" b="0" i="1" smtClean="0">
-                        <a:latin typeface="Cambria Math" panose="02040503050406030204" pitchFamily="18" charset="0"/>
-                      </a:rPr>
-                      <m:t>0</m:t>
+                      <m:t>⟩=0</m:t>
                     </m:r>
                   </m:oMath>
                 </a14:m>
@@ -11440,13 +11374,7 @@
                         <a:rPr lang="en-US" b="0" i="1" smtClean="0">
                           <a:latin typeface="Cambria Math" panose="02040503050406030204" pitchFamily="18" charset="0"/>
                         </a:rPr>
-                        <m:t>=</m:t>
-                      </m:r>
-                      <m:r>
-                        <a:rPr lang="en-US" b="0" i="1" smtClean="0">
-                          <a:latin typeface="Cambria Math" panose="02040503050406030204" pitchFamily="18" charset="0"/>
-                        </a:rPr>
-                        <m:t>0</m:t>
+                        <m:t>=0</m:t>
                       </m:r>
                     </m:oMath>
                   </m:oMathPara>
@@ -11542,13 +11470,7 @@
                       <a:rPr lang="en-US" b="0" i="1" smtClean="0">
                         <a:latin typeface="Cambria Math" panose="02040503050406030204" pitchFamily="18" charset="0"/>
                       </a:rPr>
-                      <m:t>=</m:t>
-                    </m:r>
-                    <m:r>
-                      <a:rPr lang="en-US" b="0" i="1" smtClean="0">
-                        <a:latin typeface="Cambria Math" panose="02040503050406030204" pitchFamily="18" charset="0"/>
-                      </a:rPr>
-                      <m:t>1</m:t>
+                      <m:t>=1</m:t>
                     </m:r>
                   </m:oMath>
                 </a14:m>
@@ -11800,13 +11722,7 @@
                       <a:rPr lang="en-US" b="0" i="1" smtClean="0">
                         <a:latin typeface="Cambria Math" panose="02040503050406030204" pitchFamily="18" charset="0"/>
                       </a:rPr>
-                      <m:t>=</m:t>
-                    </m:r>
-                    <m:r>
-                      <a:rPr lang="en-US" b="0" i="1" smtClean="0">
-                        <a:latin typeface="Cambria Math" panose="02040503050406030204" pitchFamily="18" charset="0"/>
-                      </a:rPr>
-                      <m:t>1</m:t>
+                      <m:t>=1</m:t>
                     </m:r>
                   </m:oMath>
                 </a14:m>
@@ -12027,19 +11943,7 @@
                       <a:rPr lang="en-US" sz="2000" b="0" i="1" smtClean="0">
                         <a:latin typeface="Cambria Math" panose="02040503050406030204" pitchFamily="18" charset="0"/>
                       </a:rPr>
-                      <m:t>−</m:t>
-                    </m:r>
-                    <m:r>
-                      <a:rPr lang="en-US" sz="2000" b="0" i="1" smtClean="0">
-                        <a:latin typeface="Cambria Math" panose="02040503050406030204" pitchFamily="18" charset="0"/>
-                      </a:rPr>
-                      <m:t>1</m:t>
-                    </m:r>
-                    <m:r>
-                      <a:rPr lang="en-US" sz="2000" b="0" i="1" smtClean="0">
-                        <a:latin typeface="Cambria Math" panose="02040503050406030204" pitchFamily="18" charset="0"/>
-                      </a:rPr>
-                      <m:t>:</m:t>
+                      <m:t>−1:</m:t>
                     </m:r>
                   </m:oMath>
                 </a14:m>
@@ -12093,13 +11997,7 @@
                                 <a:rPr lang="en-US" sz="2000" b="0" i="1" smtClean="0">
                                   <a:latin typeface="Cambria Math" panose="02040503050406030204" pitchFamily="18" charset="0"/>
                                 </a:rPr>
-                                <m:t>+</m:t>
-                              </m:r>
-                              <m:r>
-                                <a:rPr lang="en-US" sz="2000" b="0" i="1" smtClean="0">
-                                  <a:latin typeface="Cambria Math" panose="02040503050406030204" pitchFamily="18" charset="0"/>
-                                </a:rPr>
-                                <m:t>1</m:t>
+                                <m:t>+1</m:t>
                               </m:r>
                             </m:sub>
                           </m:sSub>
@@ -12158,13 +12056,7 @@
                                     <a:rPr lang="en-US" sz="2000" b="0" i="1" smtClean="0">
                                       <a:latin typeface="Cambria Math" panose="02040503050406030204" pitchFamily="18" charset="0"/>
                                     </a:rPr>
-                                    <m:t>+</m:t>
-                                  </m:r>
-                                  <m:r>
-                                    <a:rPr lang="en-US" sz="2000" b="0" i="1" smtClean="0">
-                                      <a:latin typeface="Cambria Math" panose="02040503050406030204" pitchFamily="18" charset="0"/>
-                                    </a:rPr>
-                                    <m:t>1</m:t>
+                                    <m:t>+1</m:t>
                                   </m:r>
                                 </m:sub>
                               </m:sSub>
@@ -12289,13 +12181,7 @@
                                         <a:rPr lang="en-US" sz="2000" i="1">
                                           <a:latin typeface="Cambria Math" panose="02040503050406030204" pitchFamily="18" charset="0"/>
                                         </a:rPr>
-                                        <m:t>+</m:t>
-                                      </m:r>
-                                      <m:r>
-                                        <a:rPr lang="en-US" sz="2000" i="1">
-                                          <a:latin typeface="Cambria Math" panose="02040503050406030204" pitchFamily="18" charset="0"/>
-                                        </a:rPr>
-                                        <m:t>1</m:t>
+                                        <m:t>+1</m:t>
                                       </m:r>
                                     </m:sub>
                                   </m:sSub>
@@ -12391,13 +12277,7 @@
                                         <a:rPr lang="en-US" sz="2000" i="1">
                                           <a:latin typeface="Cambria Math" panose="02040503050406030204" pitchFamily="18" charset="0"/>
                                         </a:rPr>
-                                        <m:t>+</m:t>
-                                      </m:r>
-                                      <m:r>
-                                        <a:rPr lang="en-US" sz="2000" i="1">
-                                          <a:latin typeface="Cambria Math" panose="02040503050406030204" pitchFamily="18" charset="0"/>
-                                        </a:rPr>
-                                        <m:t>1</m:t>
+                                        <m:t>+1</m:t>
                                       </m:r>
                                     </m:sub>
                                   </m:sSub>
@@ -12522,13 +12402,7 @@
                                             <a:rPr lang="en-US" sz="2000" i="1">
                                               <a:latin typeface="Cambria Math" panose="02040503050406030204" pitchFamily="18" charset="0"/>
                                             </a:rPr>
-                                            <m:t>+</m:t>
-                                          </m:r>
-                                          <m:r>
-                                            <a:rPr lang="en-US" sz="2000" i="1">
-                                              <a:latin typeface="Cambria Math" panose="02040503050406030204" pitchFamily="18" charset="0"/>
-                                            </a:rPr>
-                                            <m:t>1</m:t>
+                                            <m:t>+1</m:t>
                                           </m:r>
                                         </m:sub>
                                       </m:sSub>
@@ -12636,13 +12510,7 @@
                                 <a:rPr lang="en-US" sz="2000" i="1">
                                   <a:latin typeface="Cambria Math" panose="02040503050406030204" pitchFamily="18" charset="0"/>
                                 </a:rPr>
-                                <m:t>+</m:t>
-                              </m:r>
-                              <m:r>
-                                <a:rPr lang="en-US" sz="2000" i="1">
-                                  <a:latin typeface="Cambria Math" panose="02040503050406030204" pitchFamily="18" charset="0"/>
-                                </a:rPr>
-                                <m:t>1</m:t>
+                                <m:t>+1</m:t>
                               </m:r>
                             </m:sub>
                           </m:sSub>
@@ -12701,13 +12569,7 @@
                                     <a:rPr lang="en-US" sz="2000" i="1">
                                       <a:latin typeface="Cambria Math" panose="02040503050406030204" pitchFamily="18" charset="0"/>
                                     </a:rPr>
-                                    <m:t>+</m:t>
-                                  </m:r>
-                                  <m:r>
-                                    <a:rPr lang="en-US" sz="2000" i="1">
-                                      <a:latin typeface="Cambria Math" panose="02040503050406030204" pitchFamily="18" charset="0"/>
-                                    </a:rPr>
-                                    <m:t>1</m:t>
+                                    <m:t>+1</m:t>
                                   </m:r>
                                 </m:sub>
                               </m:sSub>
@@ -12832,13 +12694,7 @@
                                         <a:rPr lang="en-US" sz="2000" i="1">
                                           <a:latin typeface="Cambria Math" panose="02040503050406030204" pitchFamily="18" charset="0"/>
                                         </a:rPr>
-                                        <m:t>+</m:t>
-                                      </m:r>
-                                      <m:r>
-                                        <a:rPr lang="en-US" sz="2000" i="1">
-                                          <a:latin typeface="Cambria Math" panose="02040503050406030204" pitchFamily="18" charset="0"/>
-                                        </a:rPr>
-                                        <m:t>1</m:t>
+                                        <m:t>+1</m:t>
                                       </m:r>
                                     </m:sub>
                                   </m:sSub>
@@ -12934,13 +12790,7 @@
                                         <a:rPr lang="en-US" sz="2000" i="1">
                                           <a:latin typeface="Cambria Math" panose="02040503050406030204" pitchFamily="18" charset="0"/>
                                         </a:rPr>
-                                        <m:t>+</m:t>
-                                      </m:r>
-                                      <m:r>
-                                        <a:rPr lang="en-US" sz="2000" i="1">
-                                          <a:latin typeface="Cambria Math" panose="02040503050406030204" pitchFamily="18" charset="0"/>
-                                        </a:rPr>
-                                        <m:t>1</m:t>
+                                        <m:t>+1</m:t>
                                       </m:r>
                                     </m:sub>
                                   </m:sSub>
@@ -13065,13 +12915,7 @@
                                             <a:rPr lang="en-US" sz="2000" i="1">
                                               <a:latin typeface="Cambria Math" panose="02040503050406030204" pitchFamily="18" charset="0"/>
                                             </a:rPr>
-                                            <m:t>+</m:t>
-                                          </m:r>
-                                          <m:r>
-                                            <a:rPr lang="en-US" sz="2000" i="1">
-                                              <a:latin typeface="Cambria Math" panose="02040503050406030204" pitchFamily="18" charset="0"/>
-                                            </a:rPr>
-                                            <m:t>1</m:t>
+                                            <m:t>+1</m:t>
                                           </m:r>
                                         </m:sub>
                                       </m:sSub>
@@ -13174,13 +13018,7 @@
                             <a:rPr lang="en-US" sz="2000" b="0" i="1" smtClean="0">
                               <a:latin typeface="Cambria Math" panose="02040503050406030204" pitchFamily="18" charset="0"/>
                             </a:rPr>
-                            <m:t>+</m:t>
-                          </m:r>
-                          <m:r>
-                            <a:rPr lang="en-US" sz="2000" b="0" i="1" smtClean="0">
-                              <a:latin typeface="Cambria Math" panose="02040503050406030204" pitchFamily="18" charset="0"/>
-                            </a:rPr>
-                            <m:t>1</m:t>
+                            <m:t>+1</m:t>
                           </m:r>
                         </m:sub>
                       </m:sSub>
@@ -13222,13 +13060,7 @@
                                 <a:rPr lang="en-US" sz="2000" b="0" i="1" smtClean="0">
                                   <a:latin typeface="Cambria Math" panose="02040503050406030204" pitchFamily="18" charset="0"/>
                                 </a:rPr>
-                                <m:t>+</m:t>
-                              </m:r>
-                              <m:r>
-                                <a:rPr lang="en-US" sz="2000" b="0" i="1" smtClean="0">
-                                  <a:latin typeface="Cambria Math" panose="02040503050406030204" pitchFamily="18" charset="0"/>
-                                </a:rPr>
-                                <m:t>1</m:t>
+                                <m:t>+1</m:t>
                               </m:r>
                             </m:sub>
                           </m:sSub>
@@ -13282,13 +13114,7 @@
                                 <a:rPr lang="en-US" sz="2000" i="1">
                                   <a:latin typeface="Cambria Math" panose="02040503050406030204" pitchFamily="18" charset="0"/>
                                 </a:rPr>
-                                <m:t>+</m:t>
-                              </m:r>
-                              <m:r>
-                                <a:rPr lang="en-US" sz="2000" i="1">
-                                  <a:latin typeface="Cambria Math" panose="02040503050406030204" pitchFamily="18" charset="0"/>
-                                </a:rPr>
-                                <m:t>1</m:t>
+                                <m:t>+1</m:t>
                               </m:r>
                             </m:sub>
                           </m:sSub>
@@ -13330,13 +13156,7 @@
                                     <a:rPr lang="en-US" sz="2000" i="1">
                                       <a:latin typeface="Cambria Math" panose="02040503050406030204" pitchFamily="18" charset="0"/>
                                     </a:rPr>
-                                    <m:t>+</m:t>
-                                  </m:r>
-                                  <m:r>
-                                    <a:rPr lang="en-US" sz="2000" i="1">
-                                      <a:latin typeface="Cambria Math" panose="02040503050406030204" pitchFamily="18" charset="0"/>
-                                    </a:rPr>
-                                    <m:t>1</m:t>
+                                    <m:t>+1</m:t>
                                   </m:r>
                                 </m:sub>
                               </m:sSub>
@@ -13466,13 +13286,7 @@
                                             <a:rPr lang="en-US" sz="2000" i="1">
                                               <a:latin typeface="Cambria Math" panose="02040503050406030204" pitchFamily="18" charset="0"/>
                                             </a:rPr>
-                                            <m:t>+</m:t>
-                                          </m:r>
-                                          <m:r>
-                                            <a:rPr lang="en-US" sz="2000" i="1">
-                                              <a:latin typeface="Cambria Math" panose="02040503050406030204" pitchFamily="18" charset="0"/>
-                                            </a:rPr>
-                                            <m:t>1</m:t>
+                                            <m:t>+1</m:t>
                                           </m:r>
                                         </m:sub>
                                       </m:sSub>
@@ -13509,13 +13323,7 @@
                                             <a:rPr lang="en-US" sz="2000" i="1">
                                               <a:latin typeface="Cambria Math" panose="02040503050406030204" pitchFamily="18" charset="0"/>
                                             </a:rPr>
-                                            <m:t>+</m:t>
-                                          </m:r>
-                                          <m:r>
-                                            <a:rPr lang="en-US" sz="2000" i="1">
-                                              <a:latin typeface="Cambria Math" panose="02040503050406030204" pitchFamily="18" charset="0"/>
-                                            </a:rPr>
-                                            <m:t>1</m:t>
+                                            <m:t>+1</m:t>
                                           </m:r>
                                         </m:sub>
                                       </m:sSub>
@@ -13601,13 +13409,7 @@
                                         <a:rPr lang="en-US" sz="2000" i="1">
                                           <a:latin typeface="Cambria Math" panose="02040503050406030204" pitchFamily="18" charset="0"/>
                                         </a:rPr>
-                                        <m:t>+</m:t>
-                                      </m:r>
-                                      <m:r>
-                                        <a:rPr lang="en-US" sz="2000" i="1">
-                                          <a:latin typeface="Cambria Math" panose="02040503050406030204" pitchFamily="18" charset="0"/>
-                                        </a:rPr>
-                                        <m:t>1</m:t>
+                                        <m:t>+1</m:t>
                                       </m:r>
                                     </m:sub>
                                   </m:sSub>
@@ -13737,13 +13539,7 @@
                                                 <a:rPr lang="en-US" sz="2000" i="1">
                                                   <a:latin typeface="Cambria Math" panose="02040503050406030204" pitchFamily="18" charset="0"/>
                                                 </a:rPr>
-                                                <m:t>+</m:t>
-                                              </m:r>
-                                              <m:r>
-                                                <a:rPr lang="en-US" sz="2000" i="1">
-                                                  <a:latin typeface="Cambria Math" panose="02040503050406030204" pitchFamily="18" charset="0"/>
-                                                </a:rPr>
-                                                <m:t>1</m:t>
+                                                <m:t>+1</m:t>
                                               </m:r>
                                             </m:sub>
                                           </m:sSub>
@@ -13835,13 +13631,7 @@
                                         <a:rPr lang="en-US" sz="2000" i="1">
                                           <a:latin typeface="Cambria Math" panose="02040503050406030204" pitchFamily="18" charset="0"/>
                                         </a:rPr>
-                                        <m:t>+</m:t>
-                                      </m:r>
-                                      <m:r>
-                                        <a:rPr lang="en-US" sz="2000" i="1">
-                                          <a:latin typeface="Cambria Math" panose="02040503050406030204" pitchFamily="18" charset="0"/>
-                                        </a:rPr>
-                                        <m:t>1</m:t>
+                                        <m:t>+1</m:t>
                                       </m:r>
                                     </m:sub>
                                   </m:sSub>
@@ -13971,13 +13761,7 @@
                                                 <a:rPr lang="en-US" sz="2000" i="1">
                                                   <a:latin typeface="Cambria Math" panose="02040503050406030204" pitchFamily="18" charset="0"/>
                                                 </a:rPr>
-                                                <m:t>+</m:t>
-                                              </m:r>
-                                              <m:r>
-                                                <a:rPr lang="en-US" sz="2000" i="1">
-                                                  <a:latin typeface="Cambria Math" panose="02040503050406030204" pitchFamily="18" charset="0"/>
-                                                </a:rPr>
-                                                <m:t>1</m:t>
+                                                <m:t>+1</m:t>
                                               </m:r>
                                             </m:sub>
                                           </m:sSub>
@@ -14026,13 +13810,7 @@
                         <a:rPr lang="en-US" sz="2000" b="0" i="1" smtClean="0">
                           <a:latin typeface="Cambria Math" panose="02040503050406030204" pitchFamily="18" charset="0"/>
                         </a:rPr>
-                        <m:t>=</m:t>
-                      </m:r>
-                      <m:r>
-                        <a:rPr lang="en-US" sz="2000" b="0" i="1" smtClean="0">
-                          <a:latin typeface="Cambria Math" panose="02040503050406030204" pitchFamily="18" charset="0"/>
-                        </a:rPr>
-                        <m:t>0</m:t>
+                        <m:t>=0</m:t>
                       </m:r>
                     </m:oMath>
                   </m:oMathPara>
@@ -14080,14 +13858,7 @@
                         <a:latin typeface="Cambria Math" panose="02040503050406030204" pitchFamily="18" charset="0"/>
                         <a:ea typeface="Cambria Math" panose="02040503050406030204" pitchFamily="18" charset="0"/>
                       </a:rPr>
-                      <m:t>+</m:t>
-                    </m:r>
-                    <m:r>
-                      <a:rPr lang="en-US" sz="2000" b="0" i="1" smtClean="0">
-                        <a:latin typeface="Cambria Math" panose="02040503050406030204" pitchFamily="18" charset="0"/>
-                        <a:ea typeface="Cambria Math" panose="02040503050406030204" pitchFamily="18" charset="0"/>
-                      </a:rPr>
-                      <m:t>1</m:t>
+                      <m:t>+1</m:t>
                     </m:r>
                   </m:oMath>
                 </a14:m>
@@ -14135,13 +13906,7 @@
                               <a:rPr lang="en-US" sz="2000" b="0" i="1" smtClean="0">
                                 <a:latin typeface="Cambria Math" panose="02040503050406030204" pitchFamily="18" charset="0"/>
                               </a:rPr>
-                              <m:t>+</m:t>
-                            </m:r>
-                            <m:r>
-                              <a:rPr lang="en-US" sz="2000" b="0" i="1" smtClean="0">
-                                <a:latin typeface="Cambria Math" panose="02040503050406030204" pitchFamily="18" charset="0"/>
-                              </a:rPr>
-                              <m:t>1</m:t>
+                              <m:t>+1</m:t>
                             </m:r>
                           </m:sub>
                         </m:sSub>
@@ -14178,13 +13943,7 @@
                       <a:rPr lang="en-US" sz="2000" b="0" i="1" smtClean="0">
                         <a:latin typeface="Cambria Math" panose="02040503050406030204" pitchFamily="18" charset="0"/>
                       </a:rPr>
-                      <m:t>=</m:t>
-                    </m:r>
-                    <m:r>
-                      <a:rPr lang="en-US" sz="2000" b="0" i="1" smtClean="0">
-                        <a:latin typeface="Cambria Math" panose="02040503050406030204" pitchFamily="18" charset="0"/>
-                      </a:rPr>
-                      <m:t>0</m:t>
+                      <m:t>=0</m:t>
                     </m:r>
                   </m:oMath>
                 </a14:m>
@@ -15362,14 +15121,7 @@
                                 <a:latin typeface="Cambria Math" panose="02040503050406030204" pitchFamily="18" charset="0"/>
                                 <a:ea typeface="Cambria Math" panose="02040503050406030204" pitchFamily="18" charset="0"/>
                               </a:rPr>
-                              <m:t>1</m:t>
-                            </m:r>
-                            <m:r>
-                              <a:rPr lang="en-US" b="0" i="1" smtClean="0">
-                                <a:latin typeface="Cambria Math" panose="02040503050406030204" pitchFamily="18" charset="0"/>
-                                <a:ea typeface="Cambria Math" panose="02040503050406030204" pitchFamily="18" charset="0"/>
-                              </a:rPr>
-                              <m:t> </m:t>
+                              <m:t>1 </m:t>
                             </m:r>
                             <m:r>
                               <a:rPr lang="en-US" b="0" i="1" smtClean="0">
@@ -15413,14 +15165,7 @@
                                 <a:latin typeface="Cambria Math" panose="02040503050406030204" pitchFamily="18" charset="0"/>
                                 <a:ea typeface="Cambria Math" panose="02040503050406030204" pitchFamily="18" charset="0"/>
                               </a:rPr>
-                              <m:t>0</m:t>
-                            </m:r>
-                            <m:r>
-                              <a:rPr lang="en-US" b="0" i="1" smtClean="0">
-                                <a:latin typeface="Cambria Math" panose="02040503050406030204" pitchFamily="18" charset="0"/>
-                                <a:ea typeface="Cambria Math" panose="02040503050406030204" pitchFamily="18" charset="0"/>
-                              </a:rPr>
-                              <m:t> </m:t>
+                              <m:t>0 </m:t>
                             </m:r>
                             <m:r>
                               <a:rPr lang="en-US" b="0" i="1" smtClean="0">
@@ -19146,55 +18891,7 @@
                         <a:rPr lang="en-US" b="0" i="1" smtClean="0">
                           <a:latin typeface="Cambria Math" panose="02040503050406030204" pitchFamily="18" charset="0"/>
                         </a:rPr>
-                        <m:t>=|</m:t>
-                      </m:r>
-                      <m:r>
-                        <a:rPr lang="en-US" b="0" i="1" smtClean="0">
-                          <a:latin typeface="Cambria Math" panose="02040503050406030204" pitchFamily="18" charset="0"/>
-                        </a:rPr>
-                        <m:t>0</m:t>
-                      </m:r>
-                      <m:r>
-                        <a:rPr lang="en-US" b="0" i="1" smtClean="0">
-                          <a:latin typeface="Cambria Math" panose="02040503050406030204" pitchFamily="18" charset="0"/>
-                        </a:rPr>
-                        <m:t>⟩⟨</m:t>
-                      </m:r>
-                      <m:r>
-                        <a:rPr lang="en-US" b="0" i="1" smtClean="0">
-                          <a:latin typeface="Cambria Math" panose="02040503050406030204" pitchFamily="18" charset="0"/>
-                        </a:rPr>
-                        <m:t>0</m:t>
-                      </m:r>
-                      <m:r>
-                        <a:rPr lang="en-US" b="0" i="1" smtClean="0">
-                          <a:latin typeface="Cambria Math" panose="02040503050406030204" pitchFamily="18" charset="0"/>
-                        </a:rPr>
-                        <m:t>|+|</m:t>
-                      </m:r>
-                      <m:r>
-                        <a:rPr lang="en-US" b="0" i="1" smtClean="0">
-                          <a:latin typeface="Cambria Math" panose="02040503050406030204" pitchFamily="18" charset="0"/>
-                        </a:rPr>
-                        <m:t>1</m:t>
-                      </m:r>
-                      <m:r>
-                        <a:rPr lang="en-US" b="0" i="1" smtClean="0">
-                          <a:latin typeface="Cambria Math" panose="02040503050406030204" pitchFamily="18" charset="0"/>
-                        </a:rPr>
-                        <m:t>⟩⟨</m:t>
-                      </m:r>
-                      <m:r>
-                        <a:rPr lang="en-US" b="0" i="1" smtClean="0">
-                          <a:latin typeface="Cambria Math" panose="02040503050406030204" pitchFamily="18" charset="0"/>
-                        </a:rPr>
-                        <m:t>1</m:t>
-                      </m:r>
-                      <m:r>
-                        <a:rPr lang="en-US" b="0" i="1" smtClean="0">
-                          <a:latin typeface="Cambria Math" panose="02040503050406030204" pitchFamily="18" charset="0"/>
-                        </a:rPr>
-                        <m:t>| </m:t>
+                        <m:t>=|0⟩⟨0|+|1⟩⟨1| </m:t>
                       </m:r>
                     </m:oMath>
                   </m:oMathPara>
@@ -19306,19 +19003,7 @@
                         <a:rPr lang="en-US" i="1">
                           <a:latin typeface="Cambria Math" panose="02040503050406030204" pitchFamily="18" charset="0"/>
                         </a:rPr>
-                        <m:t>=|</m:t>
-                      </m:r>
-                      <m:r>
-                        <a:rPr lang="en-US" i="1">
-                          <a:latin typeface="Cambria Math" panose="02040503050406030204" pitchFamily="18" charset="0"/>
-                        </a:rPr>
-                        <m:t>0</m:t>
-                      </m:r>
-                      <m:r>
-                        <a:rPr lang="en-US" i="1">
-                          <a:latin typeface="Cambria Math" panose="02040503050406030204" pitchFamily="18" charset="0"/>
-                        </a:rPr>
-                        <m:t>⟩⟨</m:t>
+                        <m:t>=|0⟩⟨</m:t>
                       </m:r>
                       <m:r>
                         <a:rPr lang="en-US" b="0" i="1" smtClean="0">
@@ -19330,19 +19015,7 @@
                         <a:rPr lang="en-US" i="1">
                           <a:latin typeface="Cambria Math" panose="02040503050406030204" pitchFamily="18" charset="0"/>
                         </a:rPr>
-                        <m:t>|+|</m:t>
-                      </m:r>
-                      <m:r>
-                        <a:rPr lang="en-US" i="1">
-                          <a:latin typeface="Cambria Math" panose="02040503050406030204" pitchFamily="18" charset="0"/>
-                        </a:rPr>
-                        <m:t>1</m:t>
-                      </m:r>
-                      <m:r>
-                        <a:rPr lang="en-US" i="1">
-                          <a:latin typeface="Cambria Math" panose="02040503050406030204" pitchFamily="18" charset="0"/>
-                        </a:rPr>
-                        <m:t>⟩⟨</m:t>
+                        <m:t>|+|1⟩⟨</m:t>
                       </m:r>
                       <m:r>
                         <a:rPr lang="en-US" b="0" i="1" smtClean="0">
@@ -19486,31 +19159,7 @@
                         <a:rPr lang="en-US" i="1">
                           <a:latin typeface="Cambria Math" panose="02040503050406030204" pitchFamily="18" charset="0"/>
                         </a:rPr>
-                        <m:t>|</m:t>
-                      </m:r>
-                      <m:r>
-                        <a:rPr lang="en-US" i="1">
-                          <a:latin typeface="Cambria Math" panose="02040503050406030204" pitchFamily="18" charset="0"/>
-                        </a:rPr>
-                        <m:t>0</m:t>
-                      </m:r>
-                      <m:r>
-                        <a:rPr lang="en-US" i="1">
-                          <a:latin typeface="Cambria Math" panose="02040503050406030204" pitchFamily="18" charset="0"/>
-                        </a:rPr>
-                        <m:t>⟩⟨</m:t>
-                      </m:r>
-                      <m:r>
-                        <a:rPr lang="en-US" i="1">
-                          <a:latin typeface="Cambria Math" panose="02040503050406030204" pitchFamily="18" charset="0"/>
-                        </a:rPr>
-                        <m:t>1</m:t>
-                      </m:r>
-                      <m:r>
-                        <a:rPr lang="en-US" i="1">
-                          <a:latin typeface="Cambria Math" panose="02040503050406030204" pitchFamily="18" charset="0"/>
-                        </a:rPr>
-                        <m:t>|+</m:t>
+                        <m:t>|0⟩⟨1|+</m:t>
                       </m:r>
                       <m:r>
                         <a:rPr lang="en-US" b="0" i="1" smtClean="0">
@@ -19522,31 +19171,7 @@
                         <a:rPr lang="en-US" i="1">
                           <a:latin typeface="Cambria Math" panose="02040503050406030204" pitchFamily="18" charset="0"/>
                         </a:rPr>
-                        <m:t>|</m:t>
-                      </m:r>
-                      <m:r>
-                        <a:rPr lang="en-US" i="1">
-                          <a:latin typeface="Cambria Math" panose="02040503050406030204" pitchFamily="18" charset="0"/>
-                        </a:rPr>
-                        <m:t>1</m:t>
-                      </m:r>
-                      <m:r>
-                        <a:rPr lang="en-US" i="1">
-                          <a:latin typeface="Cambria Math" panose="02040503050406030204" pitchFamily="18" charset="0"/>
-                        </a:rPr>
-                        <m:t>⟩⟨</m:t>
-                      </m:r>
-                      <m:r>
-                        <a:rPr lang="en-US" i="1">
-                          <a:latin typeface="Cambria Math" panose="02040503050406030204" pitchFamily="18" charset="0"/>
-                        </a:rPr>
-                        <m:t>0</m:t>
-                      </m:r>
-                      <m:r>
-                        <a:rPr lang="en-US" i="1">
-                          <a:latin typeface="Cambria Math" panose="02040503050406030204" pitchFamily="18" charset="0"/>
-                        </a:rPr>
-                        <m:t>|</m:t>
+                        <m:t>|1⟩⟨0|</m:t>
                       </m:r>
                     </m:oMath>
                   </m:oMathPara>
@@ -19647,13 +19272,7 @@
                                   <a:rPr lang="en-US" i="1">
                                     <a:latin typeface="Cambria Math" panose="02040503050406030204" pitchFamily="18" charset="0"/>
                                   </a:rPr>
-                                  <m:t>−</m:t>
-                                </m:r>
-                                <m:r>
-                                  <a:rPr lang="en-US" i="1">
-                                    <a:latin typeface="Cambria Math" panose="02040503050406030204" pitchFamily="18" charset="0"/>
-                                  </a:rPr>
-                                  <m:t>1</m:t>
+                                  <m:t>−1</m:t>
                                 </m:r>
                               </m:e>
                             </m:mr>
@@ -19664,55 +19283,7 @@
                         <a:rPr lang="en-US" i="1">
                           <a:latin typeface="Cambria Math" panose="02040503050406030204" pitchFamily="18" charset="0"/>
                         </a:rPr>
-                        <m:t>=|</m:t>
-                      </m:r>
-                      <m:r>
-                        <a:rPr lang="en-US" i="1">
-                          <a:latin typeface="Cambria Math" panose="02040503050406030204" pitchFamily="18" charset="0"/>
-                        </a:rPr>
-                        <m:t>0</m:t>
-                      </m:r>
-                      <m:r>
-                        <a:rPr lang="en-US" i="1">
-                          <a:latin typeface="Cambria Math" panose="02040503050406030204" pitchFamily="18" charset="0"/>
-                        </a:rPr>
-                        <m:t>⟩⟨</m:t>
-                      </m:r>
-                      <m:r>
-                        <a:rPr lang="en-US" i="1">
-                          <a:latin typeface="Cambria Math" panose="02040503050406030204" pitchFamily="18" charset="0"/>
-                        </a:rPr>
-                        <m:t>0</m:t>
-                      </m:r>
-                      <m:r>
-                        <a:rPr lang="en-US" i="1">
-                          <a:latin typeface="Cambria Math" panose="02040503050406030204" pitchFamily="18" charset="0"/>
-                        </a:rPr>
-                        <m:t>|−|</m:t>
-                      </m:r>
-                      <m:r>
-                        <a:rPr lang="en-US" i="1">
-                          <a:latin typeface="Cambria Math" panose="02040503050406030204" pitchFamily="18" charset="0"/>
-                        </a:rPr>
-                        <m:t>1</m:t>
-                      </m:r>
-                      <m:r>
-                        <a:rPr lang="en-US" i="1">
-                          <a:latin typeface="Cambria Math" panose="02040503050406030204" pitchFamily="18" charset="0"/>
-                        </a:rPr>
-                        <m:t>⟩⟨</m:t>
-                      </m:r>
-                      <m:r>
-                        <a:rPr lang="en-US" i="1">
-                          <a:latin typeface="Cambria Math" panose="02040503050406030204" pitchFamily="18" charset="0"/>
-                        </a:rPr>
-                        <m:t>1</m:t>
-                      </m:r>
-                      <m:r>
-                        <a:rPr lang="en-US" i="1">
-                          <a:latin typeface="Cambria Math" panose="02040503050406030204" pitchFamily="18" charset="0"/>
-                        </a:rPr>
-                        <m:t>|</m:t>
+                        <m:t>=|0⟩⟨0|−|1⟩⟨1|</m:t>
                       </m:r>
                     </m:oMath>
                   </m:oMathPara>
@@ -20315,13 +19886,7 @@
                       <a:rPr lang="en-US" b="0" i="1" smtClean="0">
                         <a:latin typeface="Cambria Math" panose="02040503050406030204" pitchFamily="18" charset="0"/>
                       </a:rPr>
-                      <m:t>=</m:t>
-                    </m:r>
-                    <m:r>
-                      <a:rPr lang="en-US" b="0" i="1" smtClean="0">
-                        <a:latin typeface="Cambria Math" panose="02040503050406030204" pitchFamily="18" charset="0"/>
-                      </a:rPr>
-                      <m:t>0</m:t>
+                      <m:t>=0</m:t>
                     </m:r>
                   </m:oMath>
                 </a14:m>
@@ -20434,13 +19999,7 @@
                       <a:rPr lang="en-US" b="0" i="1" smtClean="0">
                         <a:latin typeface="Cambria Math" panose="02040503050406030204" pitchFamily="18" charset="0"/>
                       </a:rPr>
-                      <m:t>1</m:t>
-                    </m:r>
-                    <m:r>
-                      <a:rPr lang="en-US" b="0" i="1" smtClean="0">
-                        <a:latin typeface="Cambria Math" panose="02040503050406030204" pitchFamily="18" charset="0"/>
-                      </a:rPr>
-                      <m:t>⇒</m:t>
+                      <m:t>1⇒</m:t>
                     </m:r>
                     <m:d>
                       <m:dPr>
@@ -23557,19 +23116,7 @@
                       <a:rPr lang="en-US" b="0" i="1" smtClean="0">
                         <a:latin typeface="Cambria Math" panose="02040503050406030204" pitchFamily="18" charset="0"/>
                       </a:rPr>
-                      <m:t>=</m:t>
-                    </m:r>
-                    <m:r>
-                      <a:rPr lang="en-US" b="0" i="1" smtClean="0">
-                        <a:latin typeface="Cambria Math" panose="02040503050406030204" pitchFamily="18" charset="0"/>
-                      </a:rPr>
-                      <m:t>0</m:t>
-                    </m:r>
-                    <m:r>
-                      <a:rPr lang="en-US" b="0" i="1" smtClean="0">
-                        <a:latin typeface="Cambria Math" panose="02040503050406030204" pitchFamily="18" charset="0"/>
-                      </a:rPr>
-                      <m:t>:</m:t>
+                      <m:t>=0:</m:t>
                     </m:r>
                   </m:oMath>
                 </a14:m>
@@ -24054,13 +23601,7 @@
                       <a:rPr lang="en-US" b="0" i="1" smtClean="0">
                         <a:latin typeface="Cambria Math" panose="02040503050406030204" pitchFamily="18" charset="0"/>
                       </a:rPr>
-                      <m:t>=</m:t>
-                    </m:r>
-                    <m:r>
-                      <a:rPr lang="en-US" b="0" i="1" smtClean="0">
-                        <a:latin typeface="Cambria Math" panose="02040503050406030204" pitchFamily="18" charset="0"/>
-                      </a:rPr>
-                      <m:t>2</m:t>
+                      <m:t>=2</m:t>
                     </m:r>
                   </m:oMath>
                 </a14:m>
@@ -24934,13 +24475,7 @@
                         <a:rPr lang="en-US" b="0" i="1" smtClean="0">
                           <a:latin typeface="Cambria Math" panose="02040503050406030204" pitchFamily="18" charset="0"/>
                         </a:rPr>
-                        <m:t>=</m:t>
-                      </m:r>
-                      <m:r>
-                        <a:rPr lang="en-US" b="0" i="1" smtClean="0">
-                          <a:latin typeface="Cambria Math" panose="02040503050406030204" pitchFamily="18" charset="0"/>
-                        </a:rPr>
-                        <m:t>0</m:t>
+                        <m:t>=0</m:t>
                       </m:r>
                     </m:oMath>
                   </m:oMathPara>
@@ -25841,9 +25376,6 @@
                                       <m:t>1</m:t>
                                     </m:r>
                                     <m:r>
-                                      <m:rPr>
-                                        <m:brk m:alnAt="7"/>
-                                      </m:rPr>
                                       <a:rPr lang="en-US" b="0" i="1" smtClean="0">
                                         <a:latin typeface="Cambria Math" panose="02040503050406030204" pitchFamily="18" charset="0"/>
                                       </a:rPr>
@@ -25932,14 +25464,7 @@
                                   <a:latin typeface="Cambria Math" panose="02040503050406030204" pitchFamily="18" charset="0"/>
                                   <a:ea typeface="Cambria Math" panose="02040503050406030204" pitchFamily="18" charset="0"/>
                                 </a:rPr>
-                                <m:t>1</m:t>
-                              </m:r>
-                              <m:r>
-                                <a:rPr lang="en-US" b="0" i="1" smtClean="0">
-                                  <a:latin typeface="Cambria Math" panose="02040503050406030204" pitchFamily="18" charset="0"/>
-                                  <a:ea typeface="Cambria Math" panose="02040503050406030204" pitchFamily="18" charset="0"/>
-                                </a:rPr>
-                                <m:t>−</m:t>
+                                <m:t>1−</m:t>
                               </m:r>
                               <m:r>
                                 <a:rPr lang="en-US" b="0" i="1" smtClean="0">
@@ -25966,21 +25491,7 @@
                           <a:latin typeface="Cambria Math" panose="02040503050406030204" pitchFamily="18" charset="0"/>
                           <a:ea typeface="Cambria Math" panose="02040503050406030204" pitchFamily="18" charset="0"/>
                         </a:rPr>
-                        <m:t>=</m:t>
-                      </m:r>
-                      <m:r>
-                        <a:rPr lang="en-US" b="0" i="1" smtClean="0">
-                          <a:latin typeface="Cambria Math" panose="02040503050406030204" pitchFamily="18" charset="0"/>
-                          <a:ea typeface="Cambria Math" panose="02040503050406030204" pitchFamily="18" charset="0"/>
-                        </a:rPr>
-                        <m:t>0</m:t>
-                      </m:r>
-                      <m:r>
-                        <a:rPr lang="en-US" b="0" i="1" smtClean="0">
-                          <a:latin typeface="Cambria Math" panose="02040503050406030204" pitchFamily="18" charset="0"/>
-                          <a:ea typeface="Cambria Math" panose="02040503050406030204" pitchFamily="18" charset="0"/>
-                        </a:rPr>
-                        <m:t>∴</m:t>
+                        <m:t>=0∴</m:t>
                       </m:r>
                       <m:r>
                         <a:rPr lang="en-US" b="0" i="1" smtClean="0">
@@ -25994,14 +25505,7 @@
                           <a:latin typeface="Cambria Math" panose="02040503050406030204" pitchFamily="18" charset="0"/>
                           <a:ea typeface="Cambria Math" panose="02040503050406030204" pitchFamily="18" charset="0"/>
                         </a:rPr>
-                        <m:t>=</m:t>
-                      </m:r>
-                      <m:r>
-                        <a:rPr lang="en-US" b="0" i="1" smtClean="0">
-                          <a:latin typeface="Cambria Math" panose="02040503050406030204" pitchFamily="18" charset="0"/>
-                          <a:ea typeface="Cambria Math" panose="02040503050406030204" pitchFamily="18" charset="0"/>
-                        </a:rPr>
-                        <m:t>1</m:t>
+                        <m:t>=1</m:t>
                       </m:r>
                     </m:oMath>
                   </m:oMathPara>
@@ -26372,13 +25876,7 @@
                                 <a:rPr lang="en-US" b="0" i="1" smtClean="0">
                                   <a:latin typeface="Cambria Math" panose="02040503050406030204" pitchFamily="18" charset="0"/>
                                 </a:rPr>
-                                <m:t>=</m:t>
-                              </m:r>
-                              <m:r>
-                                <a:rPr lang="en-US" b="0" i="1" smtClean="0">
-                                  <a:latin typeface="Cambria Math" panose="02040503050406030204" pitchFamily="18" charset="0"/>
-                                </a:rPr>
-                                <m:t>0</m:t>
+                                <m:t>=0</m:t>
                               </m:r>
                             </m:e>
                             <m:e>
@@ -26392,13 +25890,7 @@
                                 <a:rPr lang="en-US" b="0" i="1" smtClean="0">
                                   <a:latin typeface="Cambria Math" panose="02040503050406030204" pitchFamily="18" charset="0"/>
                                 </a:rPr>
-                                <m:t>=</m:t>
-                              </m:r>
-                              <m:r>
-                                <a:rPr lang="en-US" b="0" i="1" smtClean="0">
-                                  <a:latin typeface="Cambria Math" panose="02040503050406030204" pitchFamily="18" charset="0"/>
-                                </a:rPr>
-                                <m:t>1</m:t>
+                                <m:t>=1</m:t>
                               </m:r>
                             </m:e>
                           </m:eqArr>
@@ -26464,31 +25956,7 @@
                         <a:rPr lang="en-US" b="0" i="1" smtClean="0">
                           <a:latin typeface="Cambria Math" panose="02040503050406030204" pitchFamily="18" charset="0"/>
                         </a:rPr>
-                        <m:t>≠|</m:t>
-                      </m:r>
-                      <m:r>
-                        <a:rPr lang="en-US" b="0" i="1" smtClean="0">
-                          <a:latin typeface="Cambria Math" panose="02040503050406030204" pitchFamily="18" charset="0"/>
-                        </a:rPr>
-                        <m:t>1</m:t>
-                      </m:r>
-                      <m:r>
-                        <a:rPr lang="en-US" b="0" i="1" smtClean="0">
-                          <a:latin typeface="Cambria Math" panose="02040503050406030204" pitchFamily="18" charset="0"/>
-                        </a:rPr>
-                        <m:t>⟩⟨</m:t>
-                      </m:r>
-                      <m:r>
-                        <a:rPr lang="en-US" b="0" i="1" smtClean="0">
-                          <a:latin typeface="Cambria Math" panose="02040503050406030204" pitchFamily="18" charset="0"/>
-                        </a:rPr>
-                        <m:t>1</m:t>
-                      </m:r>
-                      <m:r>
-                        <a:rPr lang="en-US" b="0" i="1" smtClean="0">
-                          <a:latin typeface="Cambria Math" panose="02040503050406030204" pitchFamily="18" charset="0"/>
-                        </a:rPr>
-                        <m:t>|=</m:t>
+                        <m:t>≠|1⟩⟨1|=</m:t>
                       </m:r>
                       <m:d>
                         <m:dPr>
@@ -26695,8 +26163,8 @@
           </a:p>
         </p:txBody>
       </p:sp>
-      <mc:AlternateContent xmlns:mc="http://schemas.openxmlformats.org/markup-compatibility/2006">
-        <mc:Choice xmlns:a14="http://schemas.microsoft.com/office/drawing/2010/main" Requires="a14">
+      <mc:AlternateContent xmlns:mc="http://schemas.openxmlformats.org/markup-compatibility/2006" xmlns:a14="http://schemas.microsoft.com/office/drawing/2010/main">
+        <mc:Choice Requires="a14">
           <p:sp>
             <p:nvSpPr>
               <p:cNvPr id="3" name="Chỗ dành sẵn cho Nội dung 2">
@@ -27343,7 +26811,7 @@
             </p:txBody>
           </p:sp>
         </mc:Choice>
-        <mc:Fallback>
+        <mc:Fallback xmlns="">
           <p:sp>
             <p:nvSpPr>
               <p:cNvPr id="3" name="Chỗ dành sẵn cho Nội dung 2">
@@ -29228,19 +28696,7 @@
                       <a:rPr lang="en-US" b="0" i="1" smtClean="0">
                         <a:latin typeface="Cambria Math" panose="02040503050406030204" pitchFamily="18" charset="0"/>
                       </a:rPr>
-                      <m:t>=|</m:t>
-                    </m:r>
-                    <m:r>
-                      <a:rPr lang="en-US" b="0" i="1" smtClean="0">
-                        <a:latin typeface="Cambria Math" panose="02040503050406030204" pitchFamily="18" charset="0"/>
-                      </a:rPr>
-                      <m:t>0</m:t>
-                    </m:r>
-                    <m:r>
-                      <a:rPr lang="en-US" b="0" i="1" smtClean="0">
-                        <a:latin typeface="Cambria Math" panose="02040503050406030204" pitchFamily="18" charset="0"/>
-                      </a:rPr>
-                      <m:t>⟩</m:t>
+                      <m:t>=|0⟩</m:t>
                     </m:r>
                   </m:oMath>
                 </a14:m>
@@ -29355,19 +28811,7 @@
                       <a:rPr lang="en-US" b="0" i="1" smtClean="0">
                         <a:latin typeface="Cambria Math" panose="02040503050406030204" pitchFamily="18" charset="0"/>
                       </a:rPr>
-                      <m:t>=|</m:t>
-                    </m:r>
-                    <m:r>
-                      <a:rPr lang="en-US" b="0" i="1" smtClean="0">
-                        <a:latin typeface="Cambria Math" panose="02040503050406030204" pitchFamily="18" charset="0"/>
-                      </a:rPr>
-                      <m:t>1</m:t>
-                    </m:r>
-                    <m:r>
-                      <a:rPr lang="en-US" b="0" i="1" smtClean="0">
-                        <a:latin typeface="Cambria Math" panose="02040503050406030204" pitchFamily="18" charset="0"/>
-                      </a:rPr>
-                      <m:t>⟩</m:t>
+                      <m:t>=|1⟩</m:t>
                     </m:r>
                   </m:oMath>
                 </a14:m>
@@ -32357,13 +31801,7 @@
                                   <a:rPr lang="en-US" b="0" i="1" smtClean="0">
                                     <a:latin typeface="Cambria Math" panose="02040503050406030204" pitchFamily="18" charset="0"/>
                                   </a:rPr>
-                                  <m:t>−</m:t>
-                                </m:r>
-                                <m:r>
-                                  <a:rPr lang="en-US" b="0" i="1" smtClean="0">
-                                    <a:latin typeface="Cambria Math" panose="02040503050406030204" pitchFamily="18" charset="0"/>
-                                  </a:rPr>
-                                  <m:t>1</m:t>
+                                  <m:t>−1</m:t>
                                 </m:r>
                               </m:e>
                             </m:mr>
@@ -33320,13 +32758,7 @@
                       <a:rPr lang="en-US" b="0" i="1" smtClean="0">
                         <a:latin typeface="Cambria Math" panose="02040503050406030204" pitchFamily="18" charset="0"/>
                       </a:rPr>
-                      <m:t>≥</m:t>
-                    </m:r>
-                    <m:r>
-                      <a:rPr lang="en-US" b="0" i="1" smtClean="0">
-                        <a:latin typeface="Cambria Math" panose="02040503050406030204" pitchFamily="18" charset="0"/>
-                      </a:rPr>
-                      <m:t>0</m:t>
+                      <m:t>≥0</m:t>
                     </m:r>
                   </m:oMath>
                 </a14:m>
@@ -33359,13 +32791,7 @@
                       <a:rPr lang="en-US" b="0" i="1" smtClean="0">
                         <a:latin typeface="Cambria Math" panose="02040503050406030204" pitchFamily="18" charset="0"/>
                       </a:rPr>
-                      <m:t>=</m:t>
-                    </m:r>
-                    <m:r>
-                      <a:rPr lang="en-US" b="0" i="1" smtClean="0">
-                        <a:latin typeface="Cambria Math" panose="02040503050406030204" pitchFamily="18" charset="0"/>
-                      </a:rPr>
-                      <m:t>0</m:t>
+                      <m:t>=0</m:t>
                     </m:r>
                   </m:oMath>
                 </a14:m>
@@ -34551,13 +33977,7 @@
                       <a:rPr lang="en-US" b="0" i="1" smtClean="0">
                         <a:latin typeface="Cambria Math" panose="02040503050406030204" pitchFamily="18" charset="0"/>
                       </a:rPr>
-                      <m:t>=</m:t>
-                    </m:r>
-                    <m:r>
-                      <a:rPr lang="en-US" b="0" i="1" smtClean="0">
-                        <a:latin typeface="Cambria Math" panose="02040503050406030204" pitchFamily="18" charset="0"/>
-                      </a:rPr>
-                      <m:t>0</m:t>
+                      <m:t>=0</m:t>
                     </m:r>
                   </m:oMath>
                 </a14:m>

</xml_diff>